<commit_message>
add week 1 slides
</commit_message>
<xml_diff>
--- a/Week 1/slides/Week 01.pptx
+++ b/Week 1/slides/Week 01.pptx
@@ -230,7 +230,7 @@
           <a:p>
             <a:fld id="{21D31660-DD44-FD4E-AC5D-7A43B1842726}" type="datetimeFigureOut">
               <a:rPr lang="en-US" smtClean="0"/>
-              <a:t>9/26/20</a:t>
+              <a:t>10/5/20</a:t>
             </a:fld>
             <a:endParaRPr lang="en-US"/>
           </a:p>
@@ -396,7 +396,7 @@
           <a:p>
             <a:fld id="{7CEF99CB-945E-ED4C-A552-AE2CA97AE922}" type="datetimeFigureOut">
               <a:rPr lang="en-US" smtClean="0"/>
-              <a:t>9/26/20</a:t>
+              <a:t>10/5/20</a:t>
             </a:fld>
             <a:endParaRPr lang="en-US"/>
           </a:p>
@@ -8903,7 +8903,15 @@
             </a:r>
             <a:r>
               <a:rPr lang="en-US" b="1" dirty="0" err="1"/>
-              <a:t>postgres</a:t>
+              <a:t>dso</a:t>
+            </a:r>
+            <a:r>
+              <a:rPr lang="en-US" b="1" dirty="0"/>
+              <a:t>-student-</a:t>
+            </a:r>
+            <a:r>
+              <a:rPr lang="en-US" b="1" dirty="0" err="1"/>
+              <a:t>ro</a:t>
             </a:r>
             <a:endParaRPr lang="en-US" b="1" dirty="0"/>
           </a:p>

</xml_diff>